<commit_message>
alcune correzioni nella relazione
</commit_message>
<xml_diff>
--- a/relazione.pptx
+++ b/relazione.pptx
@@ -2759,7 +2759,7 @@
           <a:p>
             <a:fld id="{D478EEAB-D62E-4B64-81A9-A8EE0DEB58FD}" type="datetimeFigureOut">
               <a:rPr lang="it-IT" smtClean="0"/>
-              <a:t>02/03/2022</a:t>
+              <a:t>05/03/2022</a:t>
             </a:fld>
             <a:endParaRPr lang="it-IT"/>
           </a:p>
@@ -2967,7 +2967,7 @@
           <a:p>
             <a:fld id="{D478EEAB-D62E-4B64-81A9-A8EE0DEB58FD}" type="datetimeFigureOut">
               <a:rPr lang="it-IT" smtClean="0"/>
-              <a:t>02/03/2022</a:t>
+              <a:t>05/03/2022</a:t>
             </a:fld>
             <a:endParaRPr lang="it-IT"/>
           </a:p>
@@ -3223,7 +3223,7 @@
           <a:p>
             <a:fld id="{D478EEAB-D62E-4B64-81A9-A8EE0DEB58FD}" type="datetimeFigureOut">
               <a:rPr lang="it-IT" smtClean="0"/>
-              <a:t>02/03/2022</a:t>
+              <a:t>05/03/2022</a:t>
             </a:fld>
             <a:endParaRPr lang="it-IT"/>
           </a:p>
@@ -3397,7 +3397,7 @@
           <a:p>
             <a:fld id="{D478EEAB-D62E-4B64-81A9-A8EE0DEB58FD}" type="datetimeFigureOut">
               <a:rPr lang="it-IT" smtClean="0"/>
-              <a:t>02/03/2022</a:t>
+              <a:t>05/03/2022</a:t>
             </a:fld>
             <a:endParaRPr lang="it-IT"/>
           </a:p>
@@ -3740,7 +3740,7 @@
           <a:p>
             <a:fld id="{D478EEAB-D62E-4B64-81A9-A8EE0DEB58FD}" type="datetimeFigureOut">
               <a:rPr lang="it-IT" smtClean="0"/>
-              <a:t>02/03/2022</a:t>
+              <a:t>05/03/2022</a:t>
             </a:fld>
             <a:endParaRPr lang="it-IT"/>
           </a:p>
@@ -4015,7 +4015,7 @@
           <a:p>
             <a:fld id="{D478EEAB-D62E-4B64-81A9-A8EE0DEB58FD}" type="datetimeFigureOut">
               <a:rPr lang="it-IT" smtClean="0"/>
-              <a:t>02/03/2022</a:t>
+              <a:t>05/03/2022</a:t>
             </a:fld>
             <a:endParaRPr lang="it-IT"/>
           </a:p>
@@ -4394,7 +4394,7 @@
           <a:p>
             <a:fld id="{D478EEAB-D62E-4B64-81A9-A8EE0DEB58FD}" type="datetimeFigureOut">
               <a:rPr lang="it-IT" smtClean="0"/>
-              <a:t>02/03/2022</a:t>
+              <a:t>05/03/2022</a:t>
             </a:fld>
             <a:endParaRPr lang="it-IT"/>
           </a:p>
@@ -4512,7 +4512,7 @@
           <a:p>
             <a:fld id="{D478EEAB-D62E-4B64-81A9-A8EE0DEB58FD}" type="datetimeFigureOut">
               <a:rPr lang="it-IT" smtClean="0"/>
-              <a:t>02/03/2022</a:t>
+              <a:t>05/03/2022</a:t>
             </a:fld>
             <a:endParaRPr lang="it-IT"/>
           </a:p>
@@ -4683,7 +4683,7 @@
           <a:p>
             <a:fld id="{D478EEAB-D62E-4B64-81A9-A8EE0DEB58FD}" type="datetimeFigureOut">
               <a:rPr lang="it-IT" smtClean="0"/>
-              <a:t>02/03/2022</a:t>
+              <a:t>05/03/2022</a:t>
             </a:fld>
             <a:endParaRPr lang="it-IT"/>
           </a:p>
@@ -5037,7 +5037,7 @@
           <a:p>
             <a:fld id="{D478EEAB-D62E-4B64-81A9-A8EE0DEB58FD}" type="datetimeFigureOut">
               <a:rPr lang="it-IT" smtClean="0"/>
-              <a:t>02/03/2022</a:t>
+              <a:t>05/03/2022</a:t>
             </a:fld>
             <a:endParaRPr lang="it-IT"/>
           </a:p>
@@ -5419,7 +5419,7 @@
           <a:p>
             <a:fld id="{D478EEAB-D62E-4B64-81A9-A8EE0DEB58FD}" type="datetimeFigureOut">
               <a:rPr lang="it-IT" smtClean="0"/>
-              <a:t>02/03/2022</a:t>
+              <a:t>05/03/2022</a:t>
             </a:fld>
             <a:endParaRPr lang="it-IT"/>
           </a:p>
@@ -5706,7 +5706,7 @@
           <a:p>
             <a:fld id="{D478EEAB-D62E-4B64-81A9-A8EE0DEB58FD}" type="datetimeFigureOut">
               <a:rPr lang="it-IT" smtClean="0"/>
-              <a:t>02/03/2022</a:t>
+              <a:t>05/03/2022</a:t>
             </a:fld>
             <a:endParaRPr lang="it-IT"/>
           </a:p>
@@ -6636,7 +6636,7 @@
           <a:p>
             <a:r>
               <a:rPr lang="it-IT" sz="2400"/>
-              <a:t>Nell’hard clustering o clustering rigido un’osservazione può appartenere a un solo cluster, il Fuzzy Clustering risulta più efficace quando ci troviamo in situazioni in cui gli oggetti potrebbero risultare più difficile da raggruppare per tipo.</a:t>
+              <a:t>Nell’hard clustering o clustering rigido un’osservazione può appartenere a un solo cluster, il Fuzzy Clustering risulta più efficace quando ci troviamo in situazioni in cui gli oggetti potrebbero risultare più complicati da raggruppare per tipo.</a:t>
             </a:r>
           </a:p>
           <a:p>
@@ -6741,7 +6741,7 @@
           <a:p>
             <a:r>
               <a:rPr lang="it-IT" sz="2400"/>
-              <a:t>Vogliamo suddividere le mele in rosse e verdi, nella realtà sappiamo che una mela può avere varie sfumature quindi fare una suddivisione binaria può essere rischiosa. Piuttosto ogni mela sarà presente sia nell’insieme «Rossa» sia nell’insieme «Verde» con i relativi gradi di appartenenza. </a:t>
+              <a:t>Vogliamo suddividere le mele in rosse e verdi, nella realtà sappiamo che una mela può avere moltissime sfumature quindi fare una suddivisione binaria può essere rischiosa. Piuttosto ogni mela sarà presente sia nell’insieme «Rossa» sia nell’insieme «Verde» con i relativi gradi di appartenenza. </a:t>
             </a:r>
           </a:p>
         </p:txBody>
@@ -7235,7 +7235,7 @@
             </a:pPr>
             <a:r>
               <a:rPr lang="it-IT" sz="2400"/>
-              <a:t>Ripeti fino a convergenza:</a:t>
+              <a:t>Ripeti fino a convergenza (variazione dei coefficienti tra 2 iterazioni bassa):</a:t>
             </a:r>
           </a:p>
           <a:p>
@@ -10384,7 +10384,7 @@
             </a:pPr>
             <a:r>
               <a:rPr lang="it-IT" sz="2400"/>
-              <a:t>La funzione passato in input k valuterà quale dei numeri all’interno del vettore è più idoneo, quindi non dobbiamo preoccuparci di capire in altri modi il numero opportuno di cluster, è già implementato e incluso nella funzione.</a:t>
+              <a:t>La funzione, passato in input k, valuterà quale dei numeri all’interno del vettore è più idoneo, quindi non dobbiamo preoccuparci di capire in altri modi il numero opportuno di cluster, è già implementato e incluso nella funzione.</a:t>
             </a:r>
           </a:p>
           <a:p>
@@ -10867,7 +10867,7 @@
             </a:pPr>
             <a:r>
               <a:rPr lang="it-IT" sz="2400"/>
-              <a:t>Si è notato sperimentando col codice che i metodi con entropy regularization necessitano spesso di dati standardizzati, la presenza di dati non standardizzati potrebbe provocare per via dell’implementazione della funzione degli errori nei calcoli della matrice dei gradi di appartenenza(si genererebbero dei NAN)</a:t>
+              <a:t>Si è notato sperimentando col codice che i metodi con entropy regularization necessitano spesso di dati standardizzati, la presenza di dati non standardizzati potrebbe provocare, per via dell’implementazione della funzione, degli errori nei calcoli della matrice dei gradi di appartenenza(si genererebbero dei NAN)</a:t>
             </a:r>
           </a:p>
           <a:p>
@@ -11131,7 +11131,7 @@
             </a:br>
             <a:r>
               <a:rPr lang="it-IT" sz="2400"/>
-              <a:t>Se 0 &lt; m(u) &lt; 1 allora u è parzialmente incluso all’insieme Fuzzy.</a:t>
+              <a:t>Se 0 &lt; m(u) &lt; 1 allora u è parzialmente incluso nell’insieme Fuzzy.</a:t>
             </a:r>
           </a:p>
         </p:txBody>
@@ -11431,8 +11431,8 @@
         </p:blipFill>
         <p:spPr>
           <a:xfrm>
-            <a:off x="7240334" y="1845734"/>
-            <a:ext cx="4492122" cy="4471164"/>
+            <a:off x="7240334" y="1789727"/>
+            <a:ext cx="4548392" cy="4527171"/>
           </a:xfrm>
           <a:prstGeom prst="rect">
             <a:avLst/>
@@ -11497,8 +11497,8 @@
           </a:p>
         </p:txBody>
       </p:sp>
-      <mc:AlternateContent xmlns:mc="http://schemas.openxmlformats.org/markup-compatibility/2006" xmlns:a14="http://schemas.microsoft.com/office/drawing/2010/main">
-        <mc:Choice Requires="a14">
+      <mc:AlternateContent xmlns:mc="http://schemas.openxmlformats.org/markup-compatibility/2006">
+        <mc:Choice xmlns:a14="http://schemas.microsoft.com/office/drawing/2010/main" Requires="a14">
           <p:sp>
             <p:nvSpPr>
               <p:cNvPr id="3" name="Segnaposto contenuto 2">
@@ -11602,7 +11602,7 @@
                 </a14:m>
                 <a:r>
                   <a:rPr lang="it-IT" sz="2400"/>
-                  <a:t> r tale che:</a:t>
+                  <a:t> e tale che:</a:t>
                 </a:r>
               </a:p>
               <a:p>
@@ -11650,7 +11650,7 @@
             </p:txBody>
           </p:sp>
         </mc:Choice>
-        <mc:Fallback xmlns="">
+        <mc:Fallback>
           <p:sp>
             <p:nvSpPr>
               <p:cNvPr id="3" name="Segnaposto contenuto 2">
@@ -11671,7 +11671,7 @@
               <a:blipFill>
                 <a:blip r:embed="rId2"/>
                 <a:stretch>
-                  <a:fillRect l="-1697" t="-2121" r="-1697"/>
+                  <a:fillRect l="-1697" t="-2121" r="-2121"/>
                 </a:stretch>
               </a:blipFill>
             </p:spPr>

</xml_diff>